<commit_message>
Updated files until today
</commit_message>
<xml_diff>
--- a/5. SocialStudiiesAndLifeSkills/2. LifeSkills/1. Presentations/2. IntroductionToSahajayoga/3. Virata-Introduction-to-Sahaja-Yoga-Slides.pptx
+++ b/5. SocialStudiiesAndLifeSkills/2. LifeSkills/1. Presentations/2. IntroductionToSahajayoga/3. Virata-Introduction-to-Sahaja-Yoga-Slides.pptx
@@ -9596,7 +9596,7 @@
                 <a:schemeClr val="dk1"/>
               </a:buClr>
               <a:buSzPts val="1600"/>
-              <a:buAutoNum type="arabicPeriod"/>
+              <a:buChar char="●"/>
             </a:pPr>
             <a:r>
               <a:rPr lang="en" sz="1600">
@@ -9627,7 +9627,7 @@
                 <a:schemeClr val="dk1"/>
               </a:buClr>
               <a:buSzPts val="1600"/>
-              <a:buAutoNum type="arabicPeriod"/>
+              <a:buChar char="●"/>
             </a:pPr>
             <a:r>
               <a:rPr lang="en" sz="1600">
@@ -9658,7 +9658,7 @@
                 <a:schemeClr val="dk1"/>
               </a:buClr>
               <a:buSzPts val="1600"/>
-              <a:buAutoNum type="arabicPeriod"/>
+              <a:buChar char="●"/>
             </a:pPr>
             <a:r>
               <a:rPr lang="en" sz="1600">
@@ -9689,7 +9689,7 @@
                 <a:schemeClr val="dk1"/>
               </a:buClr>
               <a:buSzPts val="1600"/>
-              <a:buAutoNum type="arabicPeriod"/>
+              <a:buChar char="●"/>
             </a:pPr>
             <a:r>
               <a:rPr lang="en" sz="1600">
@@ -9720,7 +9720,7 @@
                 <a:schemeClr val="dk1"/>
               </a:buClr>
               <a:buSzPts val="1600"/>
-              <a:buAutoNum type="arabicPeriod"/>
+              <a:buChar char="●"/>
             </a:pPr>
             <a:r>
               <a:rPr lang="en" sz="1600">
@@ -9974,7 +9974,7 @@
           </a:bodyPr>
           <a:lstStyle/>
           <a:p>
-            <a:pPr indent="0" lvl="0" marL="0" rtl="0" algn="l">
+            <a:pPr indent="-330200" lvl="0" marL="457200" rtl="0" algn="l">
               <a:lnSpc>
                 <a:spcPct val="115000"/>
               </a:lnSpc>
@@ -9982,10 +9982,13 @@
                 <a:spcPts val="0"/>
               </a:spcBef>
               <a:spcAft>
-                <a:spcPts val="1200"/>
-              </a:spcAft>
-              <a:buSzPts val="1800"/>
-              <a:buNone/>
+                <a:spcPts val="0"/>
+              </a:spcAft>
+              <a:buClr>
+                <a:schemeClr val="dk1"/>
+              </a:buClr>
+              <a:buSzPts val="1600"/>
+              <a:buChar char="●"/>
             </a:pPr>
             <a:r>
               <a:rPr b="1" lang="en" sz="1600" u="sng">
@@ -10029,8 +10032,8 @@
         </p:nvSpPr>
         <p:spPr>
           <a:xfrm>
-            <a:off x="0" y="2518375"/>
-            <a:ext cx="4955700" cy="761100"/>
+            <a:off x="0" y="2599675"/>
+            <a:ext cx="4955700" cy="679800"/>
           </a:xfrm>
           <a:prstGeom prst="rect">
             <a:avLst/>
@@ -10046,7 +10049,7 @@
           </a:bodyPr>
           <a:lstStyle/>
           <a:p>
-            <a:pPr indent="0" lvl="0" marL="0" rtl="0" algn="l">
+            <a:pPr indent="-314960" lvl="0" marL="457200" rtl="0" algn="l">
               <a:lnSpc>
                 <a:spcPct val="115000"/>
               </a:lnSpc>
@@ -10054,10 +10057,13 @@
                 <a:spcPts val="0"/>
               </a:spcBef>
               <a:spcAft>
-                <a:spcPts val="1200"/>
-              </a:spcAft>
-              <a:buSzPct val="132352"/>
-              <a:buNone/>
+                <a:spcPts val="0"/>
+              </a:spcAft>
+              <a:buClr>
+                <a:schemeClr val="dk1"/>
+              </a:buClr>
+              <a:buSzPct val="100000"/>
+              <a:buChar char="●"/>
             </a:pPr>
             <a:r>
               <a:rPr b="1" lang="en" sz="1600" u="sng">
@@ -10118,7 +10124,7 @@
           </a:bodyPr>
           <a:lstStyle/>
           <a:p>
-            <a:pPr indent="0" lvl="0" marL="0" rtl="0" algn="l">
+            <a:pPr indent="-314960" lvl="0" marL="457200" rtl="0" algn="l">
               <a:lnSpc>
                 <a:spcPct val="115000"/>
               </a:lnSpc>
@@ -10126,10 +10132,13 @@
                 <a:spcPts val="0"/>
               </a:spcBef>
               <a:spcAft>
-                <a:spcPts val="1200"/>
-              </a:spcAft>
-              <a:buSzPct val="132352"/>
-              <a:buNone/>
+                <a:spcPts val="0"/>
+              </a:spcAft>
+              <a:buClr>
+                <a:schemeClr val="dk1"/>
+              </a:buClr>
+              <a:buSzPct val="100000"/>
+              <a:buChar char="●"/>
             </a:pPr>
             <a:r>
               <a:rPr b="1" lang="en" sz="1600" u="sng">
@@ -10182,7 +10191,7 @@
           </a:bodyPr>
           <a:lstStyle/>
           <a:p>
-            <a:pPr indent="0" lvl="0" marL="0" rtl="0" algn="l">
+            <a:pPr indent="-330200" lvl="0" marL="457200" rtl="0" algn="l">
               <a:lnSpc>
                 <a:spcPct val="115000"/>
               </a:lnSpc>
@@ -10190,10 +10199,13 @@
                 <a:spcPts val="0"/>
               </a:spcBef>
               <a:spcAft>
-                <a:spcPts val="1200"/>
-              </a:spcAft>
-              <a:buSzPts val="1800"/>
-              <a:buNone/>
+                <a:spcPts val="0"/>
+              </a:spcAft>
+              <a:buClr>
+                <a:schemeClr val="dk1"/>
+              </a:buClr>
+              <a:buSzPts val="1600"/>
+              <a:buChar char="●"/>
             </a:pPr>
             <a:r>
               <a:rPr b="1" lang="en" sz="1600" u="sng">
@@ -10350,7 +10362,7 @@
           </a:bodyPr>
           <a:lstStyle/>
           <a:p>
-            <a:pPr indent="-330200" lvl="0" marL="457200" rtl="0" algn="just">
+            <a:pPr indent="0" lvl="0" marL="457200" rtl="0" algn="just">
               <a:lnSpc>
                 <a:spcPct val="115000"/>
               </a:lnSpc>
@@ -10360,11 +10372,7 @@
               <a:spcAft>
                 <a:spcPts val="0"/>
               </a:spcAft>
-              <a:buClr>
-                <a:schemeClr val="dk1"/>
-              </a:buClr>
-              <a:buSzPts val="1600"/>
-              <a:buAutoNum type="arabicPeriod"/>
+              <a:buNone/>
             </a:pPr>
             <a:r>
               <a:rPr lang="en" sz="1600">
@@ -10742,8 +10750,8 @@
         </p:blipFill>
         <p:spPr>
           <a:xfrm>
-            <a:off x="0" y="739461"/>
-            <a:ext cx="9143838" cy="4403929"/>
+            <a:off x="75" y="775100"/>
+            <a:ext cx="9143850" cy="4643350"/>
           </a:xfrm>
           <a:prstGeom prst="rect">
             <a:avLst/>
@@ -11059,22 +11067,17 @@
           </a:bodyPr>
           <a:lstStyle/>
           <a:p>
-            <a:pPr indent="-330200" lvl="0" marL="457200" marR="0" rtl="0" algn="just">
-              <a:lnSpc>
-                <a:spcPct val="100000"/>
-              </a:lnSpc>
-              <a:spcBef>
-                <a:spcPts val="0"/>
-              </a:spcBef>
-              <a:spcAft>
-                <a:spcPts val="0"/>
-              </a:spcAft>
-              <a:buClr>
-                <a:schemeClr val="dk1"/>
-              </a:buClr>
-              <a:buSzPts val="1600"/>
-              <a:buFont typeface="Arial"/>
-              <a:buAutoNum type="arabicPeriod"/>
+            <a:pPr indent="0" lvl="0" marL="457200" marR="0" rtl="0" algn="just">
+              <a:lnSpc>
+                <a:spcPct val="100000"/>
+              </a:lnSpc>
+              <a:spcBef>
+                <a:spcPts val="0"/>
+              </a:spcBef>
+              <a:spcAft>
+                <a:spcPts val="0"/>
+              </a:spcAft>
+              <a:buNone/>
             </a:pPr>
             <a:r>
               <a:rPr b="0" i="0" lang="en" sz="1600" u="none" cap="none" strike="noStrike">
@@ -11650,7 +11653,7 @@
                   <a:srgbClr val="993F0D"/>
                 </a:solidFill>
               </a:rPr>
-              <a:t>Collective  meditation &amp; References</a:t>
+              <a:t>Collective  meditation, &amp; References</a:t>
             </a:r>
             <a:endParaRPr sz="3200"/>
           </a:p>

</xml_diff>